<commit_message>
Add architecture comparison visualizations to presentation
New visualizations:
- architecture_comparison_table.png: Detailed 18-aspect comparison table
  * Approach, model backbone, input modalities
  * Feature dimensions, trainable/frozen components
  * Training strategy, hyperparameters
  * Performance metrics with highlighting

- architecture_flow_diagrams.png: Visual flow diagrams
  * E1: OPG → MedGemma (frozen) → Classifier → Output
  * E2: Multi-modal → 3 CNNs → Fusion → Output
  * E3: Multi-modal+Prompts → MedGemma (frozen) → Classifier → Output

Updated presentation:
- Now 12 slides (was 10)
- Added slides 4-5 for architecture comparisons
- Regenerated presentation.pptx (1.70 MB)

Scripts:
- create_architecture_comparison.py: Generate comparison visualizations
- Updated create_presentation.py: Include new slides
</commit_message>
<xml_diff>
--- a/presentation.pptx
+++ b/presentation.pptx
@@ -15,6 +15,8 @@
     <p:sldId id="263" r:id="rId14"/>
     <p:sldId id="264" r:id="rId15"/>
     <p:sldId id="265" r:id="rId16"/>
+    <p:sldId id="266" r:id="rId17"/>
+    <p:sldId id="267" r:id="rId18"/>
   </p:sldIdLst>
   <p:sldSz cx="9144000" cy="6858000" type="screen4x3"/>
   <p:notesSz cx="6858000" cy="9144000"/>
@@ -3185,6 +3187,248 @@
         <p:txBody>
           <a:bodyPr/>
           <a:lstStyle/>
+          <a:p/>
+        </p:txBody>
+      </p:sp>
+      <p:sp>
+        <p:nvSpPr>
+          <p:cNvPr id="3" name="TextBox 2"/>
+          <p:cNvSpPr txBox="1"/>
+          <p:nvPr/>
+        </p:nvSpPr>
+        <p:spPr>
+          <a:xfrm>
+            <a:off x="457200" y="274320"/>
+            <a:ext cx="8229600" cy="548640"/>
+          </a:xfrm>
+          <a:prstGeom prst="rect">
+            <a:avLst/>
+          </a:prstGeom>
+          <a:noFill/>
+        </p:spPr>
+        <p:txBody>
+          <a:bodyPr wrap="none">
+            <a:spAutoFit/>
+          </a:bodyPr>
+          <a:lstStyle/>
+          <a:p>
+            <a:pPr>
+              <a:defRPr sz="2800" b="1"/>
+            </a:pPr>
+            <a:r>
+              <a:t>E1: OPG-only Baseline - Training Dynamics</a:t>
+            </a:r>
+          </a:p>
+        </p:txBody>
+      </p:sp>
+      <p:pic>
+        <p:nvPicPr>
+          <p:cNvPr id="4" name="Picture 3" descr="E1_OPG-only_Baseline_metrics.png"/>
+          <p:cNvPicPr>
+            <a:picLocks noChangeAspect="1"/>
+          </p:cNvPicPr>
+          <p:nvPr/>
+        </p:nvPicPr>
+        <p:blipFill>
+          <a:blip r:embed="rId2"/>
+          <a:stretch>
+            <a:fillRect/>
+          </a:stretch>
+        </p:blipFill>
+        <p:spPr>
+          <a:xfrm>
+            <a:off x="457200" y="1097280"/>
+            <a:ext cx="8229600" cy="2904333"/>
+          </a:xfrm>
+          <a:prstGeom prst="rect">
+            <a:avLst/>
+          </a:prstGeom>
+        </p:spPr>
+      </p:pic>
+      <p:sp>
+        <p:nvSpPr>
+          <p:cNvPr id="5" name="TextBox 4"/>
+          <p:cNvSpPr txBox="1"/>
+          <p:nvPr/>
+        </p:nvSpPr>
+        <p:spPr>
+          <a:xfrm>
+            <a:off x="457200" y="5943600"/>
+            <a:ext cx="8229600" cy="457200"/>
+          </a:xfrm>
+          <a:prstGeom prst="rect">
+            <a:avLst/>
+          </a:prstGeom>
+          <a:noFill/>
+        </p:spPr>
+        <p:txBody>
+          <a:bodyPr wrap="none">
+            <a:spAutoFit/>
+          </a:bodyPr>
+          <a:lstStyle/>
+          <a:p>
+            <a:pPr>
+              <a:defRPr sz="1400" i="1"/>
+            </a:pPr>
+            <a:r>
+              <a:t>Shows overfitting - validation loss increases while training continues</a:t>
+            </a:r>
+          </a:p>
+        </p:txBody>
+      </p:sp>
+    </p:spTree>
+  </p:cSld>
+  <p:clrMapOvr>
+    <a:masterClrMapping/>
+  </p:clrMapOvr>
+</p:sld>
+</file>
+
+<file path=ppt/slides/slide11.xml><?xml version="1.0" encoding="utf-8"?>
+<p:sld xmlns:a="http://schemas.openxmlformats.org/drawingml/2006/main" xmlns:p="http://schemas.openxmlformats.org/presentationml/2006/main" xmlns:r="http://schemas.openxmlformats.org/officeDocument/2006/relationships">
+  <p:cSld>
+    <p:spTree>
+      <p:nvGrpSpPr>
+        <p:cNvPr id="1" name=""/>
+        <p:cNvGrpSpPr/>
+        <p:nvPr/>
+      </p:nvGrpSpPr>
+      <p:grpSpPr/>
+      <p:sp>
+        <p:nvSpPr>
+          <p:cNvPr id="2" name="Title 1"/>
+          <p:cNvSpPr>
+            <a:spLocks noGrp="1"/>
+          </p:cNvSpPr>
+          <p:nvPr>
+            <p:ph type="title"/>
+          </p:nvPr>
+        </p:nvSpPr>
+        <p:spPr/>
+        <p:txBody>
+          <a:bodyPr/>
+          <a:lstStyle/>
+          <a:p/>
+        </p:txBody>
+      </p:sp>
+      <p:sp>
+        <p:nvSpPr>
+          <p:cNvPr id="3" name="TextBox 2"/>
+          <p:cNvSpPr txBox="1"/>
+          <p:nvPr/>
+        </p:nvSpPr>
+        <p:spPr>
+          <a:xfrm>
+            <a:off x="457200" y="274320"/>
+            <a:ext cx="8229600" cy="548640"/>
+          </a:xfrm>
+          <a:prstGeom prst="rect">
+            <a:avLst/>
+          </a:prstGeom>
+          <a:noFill/>
+        </p:spPr>
+        <p:txBody>
+          <a:bodyPr wrap="none">
+            <a:spAutoFit/>
+          </a:bodyPr>
+          <a:lstStyle/>
+          <a:p>
+            <a:pPr>
+              <a:defRPr sz="2800" b="1"/>
+            </a:pPr>
+            <a:r>
+              <a:t>E2: Late Fusion - Training Dynamics (Best Performer)</a:t>
+            </a:r>
+          </a:p>
+        </p:txBody>
+      </p:sp>
+      <p:pic>
+        <p:nvPicPr>
+          <p:cNvPr id="4" name="Picture 3" descr="E2_Late_Fusion_metrics.png"/>
+          <p:cNvPicPr>
+            <a:picLocks noChangeAspect="1"/>
+          </p:cNvPicPr>
+          <p:nvPr/>
+        </p:nvPicPr>
+        <p:blipFill>
+          <a:blip r:embed="rId2"/>
+          <a:stretch>
+            <a:fillRect/>
+          </a:stretch>
+        </p:blipFill>
+        <p:spPr>
+          <a:xfrm>
+            <a:off x="457200" y="1097280"/>
+            <a:ext cx="8229600" cy="2904333"/>
+          </a:xfrm>
+          <a:prstGeom prst="rect">
+            <a:avLst/>
+          </a:prstGeom>
+        </p:spPr>
+      </p:pic>
+      <p:sp>
+        <p:nvSpPr>
+          <p:cNvPr id="5" name="TextBox 4"/>
+          <p:cNvSpPr txBox="1"/>
+          <p:nvPr/>
+        </p:nvSpPr>
+        <p:spPr>
+          <a:xfrm>
+            <a:off x="457200" y="5943600"/>
+            <a:ext cx="8229600" cy="457200"/>
+          </a:xfrm>
+          <a:prstGeom prst="rect">
+            <a:avLst/>
+          </a:prstGeom>
+          <a:noFill/>
+        </p:spPr>
+        <p:txBody>
+          <a:bodyPr wrap="none">
+            <a:spAutoFit/>
+          </a:bodyPr>
+          <a:lstStyle/>
+          <a:p>
+            <a:pPr>
+              <a:defRPr sz="1400" i="1"/>
+            </a:pPr>
+            <a:r>
+              <a:t>Extremely stable - maintains ~93.5% validation accuracy throughout</a:t>
+            </a:r>
+          </a:p>
+        </p:txBody>
+      </p:sp>
+    </p:spTree>
+  </p:cSld>
+  <p:clrMapOvr>
+    <a:masterClrMapping/>
+  </p:clrMapOvr>
+</p:sld>
+</file>
+
+<file path=ppt/slides/slide12.xml><?xml version="1.0" encoding="utf-8"?>
+<p:sld xmlns:a="http://schemas.openxmlformats.org/drawingml/2006/main" xmlns:p="http://schemas.openxmlformats.org/presentationml/2006/main" xmlns:r="http://schemas.openxmlformats.org/officeDocument/2006/relationships">
+  <p:cSld>
+    <p:spTree>
+      <p:nvGrpSpPr>
+        <p:cNvPr id="1" name=""/>
+        <p:cNvGrpSpPr/>
+        <p:nvPr/>
+      </p:nvGrpSpPr>
+      <p:grpSpPr/>
+      <p:sp>
+        <p:nvSpPr>
+          <p:cNvPr id="2" name="Title 1"/>
+          <p:cNvSpPr>
+            <a:spLocks noGrp="1"/>
+          </p:cNvSpPr>
+          <p:nvPr>
+            <p:ph type="title"/>
+          </p:nvPr>
+        </p:nvSpPr>
+        <p:spPr/>
+        <p:txBody>
+          <a:bodyPr/>
+          <a:lstStyle/>
           <a:p>
             <a:pPr>
               <a:defRPr sz="3200" b="1"/>
@@ -3769,124 +4013,91 @@
         <p:txBody>
           <a:bodyPr/>
           <a:lstStyle/>
-          <a:p>
-            <a:pPr>
-              <a:defRPr sz="3200" b="1"/>
-            </a:pPr>
-            <a:r>
-              <a:t>Experiment 1: OPG-only Baseline</a:t>
-            </a:r>
-          </a:p>
-        </p:txBody>
-      </p:sp>
-      <p:sp>
-        <p:nvSpPr>
-          <p:cNvPr id="3" name="Content Placeholder 2"/>
-          <p:cNvSpPr>
-            <a:spLocks noGrp="1"/>
-          </p:cNvSpPr>
-          <p:nvPr>
-            <p:ph idx="1"/>
-          </p:nvPr>
-        </p:nvSpPr>
-        <p:spPr/>
-        <p:txBody>
-          <a:bodyPr/>
-          <a:lstStyle/>
           <a:p/>
-          <a:p>
-            <a:pPr>
-              <a:defRPr sz="1800"/>
-            </a:pPr>
-            <a:r>
-              <a:t>Strategy: Establish single-modality baseline using panoramic X-rays</a:t>
-            </a:r>
-          </a:p>
-          <a:p>
-            <a:pPr>
-              <a:defRPr sz="1800"/>
-            </a:pPr>
-          </a:p>
-          <a:p>
-            <a:pPr>
-              <a:defRPr sz="1800"/>
-            </a:pPr>
-            <a:r>
-              <a:t>Architecture:</a:t>
-            </a:r>
-          </a:p>
-          <a:p>
-            <a:pPr>
-              <a:defRPr sz="1800"/>
-            </a:pPr>
-            <a:r>
-              <a:t>  • Frozen MedGemma-4B vision encoder (1152-dim features)</a:t>
-            </a:r>
-          </a:p>
-          <a:p>
-            <a:pPr>
-              <a:defRPr sz="1800"/>
-            </a:pPr>
-            <a:r>
-              <a:t>  • Trainable classification head</a:t>
-            </a:r>
-          </a:p>
-          <a:p>
-            <a:pPr>
-              <a:defRPr sz="1800"/>
-            </a:pPr>
-            <a:r>
-              <a:t>  • Robust 3-tier modality filtering</a:t>
-            </a:r>
-          </a:p>
-          <a:p>
-            <a:pPr>
-              <a:defRPr sz="1800"/>
-            </a:pPr>
-          </a:p>
-          <a:p>
-            <a:pPr>
-              <a:defRPr sz="1800"/>
-            </a:pPr>
-            <a:r>
-              <a:t>Training:</a:t>
-            </a:r>
-          </a:p>
-          <a:p>
-            <a:pPr>
-              <a:defRPr sz="1800"/>
-            </a:pPr>
-            <a:r>
-              <a:t>  • 20 epochs, batch size 8</a:t>
-            </a:r>
-          </a:p>
-          <a:p>
-            <a:pPr>
-              <a:defRPr sz="1800"/>
-            </a:pPr>
-            <a:r>
-              <a:t>  • AdamW optimizer, Cosine LR scheduler</a:t>
-            </a:r>
-          </a:p>
-          <a:p>
-            <a:pPr>
-              <a:defRPr sz="1800"/>
-            </a:pPr>
-            <a:r>
-              <a:t>  • Only OPG images used</a:t>
-            </a:r>
-          </a:p>
-          <a:p>
-            <a:pPr>
-              <a:defRPr sz="1800"/>
-            </a:pPr>
-          </a:p>
-          <a:p>
-            <a:pPr>
-              <a:defRPr sz="1800"/>
-            </a:pPr>
-            <a:r>
-              <a:t>Best Performance: 66.67% validation accuracy (epoch 1)</a:t>
+        </p:txBody>
+      </p:sp>
+      <p:sp>
+        <p:nvSpPr>
+          <p:cNvPr id="3" name="TextBox 2"/>
+          <p:cNvSpPr txBox="1"/>
+          <p:nvPr/>
+        </p:nvSpPr>
+        <p:spPr>
+          <a:xfrm>
+            <a:off x="457200" y="274320"/>
+            <a:ext cx="8229600" cy="548640"/>
+          </a:xfrm>
+          <a:prstGeom prst="rect">
+            <a:avLst/>
+          </a:prstGeom>
+          <a:noFill/>
+        </p:spPr>
+        <p:txBody>
+          <a:bodyPr wrap="none">
+            <a:spAutoFit/>
+          </a:bodyPr>
+          <a:lstStyle/>
+          <a:p>
+            <a:pPr>
+              <a:defRPr sz="2800" b="1"/>
+            </a:pPr>
+            <a:r>
+              <a:t>Detailed Architecture Comparison</a:t>
+            </a:r>
+          </a:p>
+        </p:txBody>
+      </p:sp>
+      <p:pic>
+        <p:nvPicPr>
+          <p:cNvPr id="4" name="Picture 3" descr="architecture_comparison_table.png"/>
+          <p:cNvPicPr>
+            <a:picLocks noChangeAspect="1"/>
+          </p:cNvPicPr>
+          <p:nvPr/>
+        </p:nvPicPr>
+        <p:blipFill>
+          <a:blip r:embed="rId2"/>
+          <a:stretch>
+            <a:fillRect/>
+          </a:stretch>
+        </p:blipFill>
+        <p:spPr>
+          <a:xfrm>
+            <a:off x="457200" y="1097280"/>
+            <a:ext cx="8229600" cy="5125134"/>
+          </a:xfrm>
+          <a:prstGeom prst="rect">
+            <a:avLst/>
+          </a:prstGeom>
+        </p:spPr>
+      </p:pic>
+      <p:sp>
+        <p:nvSpPr>
+          <p:cNvPr id="5" name="TextBox 4"/>
+          <p:cNvSpPr txBox="1"/>
+          <p:nvPr/>
+        </p:nvSpPr>
+        <p:spPr>
+          <a:xfrm>
+            <a:off x="457200" y="5943600"/>
+            <a:ext cx="8229600" cy="457200"/>
+          </a:xfrm>
+          <a:prstGeom prst="rect">
+            <a:avLst/>
+          </a:prstGeom>
+          <a:noFill/>
+        </p:spPr>
+        <p:txBody>
+          <a:bodyPr wrap="none">
+            <a:spAutoFit/>
+          </a:bodyPr>
+          <a:lstStyle/>
+          <a:p>
+            <a:pPr>
+              <a:defRPr sz="1400" i="1"/>
+            </a:pPr>
+            <a:r>
+              <a:t>Comprehensive comparison of all architectural aspects and performance metrics</a:t>
             </a:r>
           </a:p>
         </p:txBody>
@@ -3923,108 +4134,91 @@
         <p:txBody>
           <a:bodyPr/>
           <a:lstStyle/>
-          <a:p>
-            <a:pPr>
-              <a:defRPr sz="3200" b="1"/>
-            </a:pPr>
-            <a:r>
-              <a:t>Experiment 2: Naïve Late Fusion</a:t>
-            </a:r>
-          </a:p>
-        </p:txBody>
-      </p:sp>
-      <p:sp>
-        <p:nvSpPr>
-          <p:cNvPr id="3" name="Content Placeholder 2"/>
-          <p:cNvSpPr>
-            <a:spLocks noGrp="1"/>
-          </p:cNvSpPr>
-          <p:nvPr>
-            <p:ph idx="1"/>
-          </p:nvPr>
-        </p:nvSpPr>
-        <p:spPr/>
-        <p:txBody>
-          <a:bodyPr/>
-          <a:lstStyle/>
           <a:p/>
-          <a:p>
-            <a:pPr>
-              <a:defRPr sz="1800"/>
-            </a:pPr>
-            <a:r>
-              <a:t>Strategy: Train separate classifiers per modality, fuse at decision level</a:t>
-            </a:r>
-          </a:p>
-          <a:p>
-            <a:pPr>
-              <a:defRPr sz="1800"/>
-            </a:pPr>
-          </a:p>
-          <a:p>
-            <a:pPr>
-              <a:defRPr sz="1800"/>
-            </a:pPr>
-            <a:r>
-              <a:t>Architecture:</a:t>
-            </a:r>
-          </a:p>
-          <a:p>
-            <a:pPr>
-              <a:defRPr sz="1800"/>
-            </a:pPr>
-            <a:r>
-              <a:t>  • Intraoral CNN: SimpleClassifier (512-dim) → intraoral images</a:t>
-            </a:r>
-          </a:p>
-          <a:p>
-            <a:pPr>
-              <a:defRPr sz="1800"/>
-            </a:pPr>
-            <a:r>
-              <a:t>  • OPG CNN: SimpleClassifier (512-dim) → panoramic X-rays</a:t>
-            </a:r>
-          </a:p>
-          <a:p>
-            <a:pPr>
-              <a:defRPr sz="1800"/>
-            </a:pPr>
-            <a:r>
-              <a:t>  • Ceph CNN: SimpleClassifier (512-dim) → cephalometric X-rays</a:t>
-            </a:r>
-          </a:p>
-          <a:p>
-            <a:pPr>
-              <a:defRPr sz="1800"/>
-            </a:pPr>
-            <a:r>
-              <a:t>  • Fusion: Average predictions from all three classifiers</a:t>
-            </a:r>
-          </a:p>
-          <a:p>
-            <a:pPr>
-              <a:defRPr sz="1800"/>
-            </a:pPr>
-          </a:p>
-          <a:p>
-            <a:pPr>
-              <a:defRPr sz="1800"/>
-            </a:pPr>
-            <a:r>
-              <a:t>Training: Sequential training, 45 epochs each modality</a:t>
-            </a:r>
-          </a:p>
-          <a:p>
-            <a:pPr>
-              <a:defRPr sz="1800"/>
-            </a:pPr>
-          </a:p>
-          <a:p>
-            <a:pPr>
-              <a:defRPr sz="1800"/>
-            </a:pPr>
-            <a:r>
-              <a:t>Best Performance: 93.51% validation accuracy ⭐</a:t>
+        </p:txBody>
+      </p:sp>
+      <p:sp>
+        <p:nvSpPr>
+          <p:cNvPr id="3" name="TextBox 2"/>
+          <p:cNvSpPr txBox="1"/>
+          <p:nvPr/>
+        </p:nvSpPr>
+        <p:spPr>
+          <a:xfrm>
+            <a:off x="457200" y="274320"/>
+            <a:ext cx="8229600" cy="548640"/>
+          </a:xfrm>
+          <a:prstGeom prst="rect">
+            <a:avLst/>
+          </a:prstGeom>
+          <a:noFill/>
+        </p:spPr>
+        <p:txBody>
+          <a:bodyPr wrap="none">
+            <a:spAutoFit/>
+          </a:bodyPr>
+          <a:lstStyle/>
+          <a:p>
+            <a:pPr>
+              <a:defRPr sz="2800" b="1"/>
+            </a:pPr>
+            <a:r>
+              <a:t>Architecture Flow Diagrams</a:t>
+            </a:r>
+          </a:p>
+        </p:txBody>
+      </p:sp>
+      <p:pic>
+        <p:nvPicPr>
+          <p:cNvPr id="4" name="Picture 3" descr="architecture_flow_diagrams.png"/>
+          <p:cNvPicPr>
+            <a:picLocks noChangeAspect="1"/>
+          </p:cNvPicPr>
+          <p:nvPr/>
+        </p:nvPicPr>
+        <p:blipFill>
+          <a:blip r:embed="rId2"/>
+          <a:stretch>
+            <a:fillRect/>
+          </a:stretch>
+        </p:blipFill>
+        <p:spPr>
+          <a:xfrm>
+            <a:off x="457200" y="1097280"/>
+            <a:ext cx="8229600" cy="3626551"/>
+          </a:xfrm>
+          <a:prstGeom prst="rect">
+            <a:avLst/>
+          </a:prstGeom>
+        </p:spPr>
+      </p:pic>
+      <p:sp>
+        <p:nvSpPr>
+          <p:cNvPr id="5" name="TextBox 4"/>
+          <p:cNvSpPr txBox="1"/>
+          <p:nvPr/>
+        </p:nvSpPr>
+        <p:spPr>
+          <a:xfrm>
+            <a:off x="457200" y="5943600"/>
+            <a:ext cx="8229600" cy="457200"/>
+          </a:xfrm>
+          <a:prstGeom prst="rect">
+            <a:avLst/>
+          </a:prstGeom>
+          <a:noFill/>
+        </p:spPr>
+        <p:txBody>
+          <a:bodyPr wrap="none">
+            <a:spAutoFit/>
+          </a:bodyPr>
+          <a:lstStyle/>
+          <a:p>
+            <a:pPr>
+              <a:defRPr sz="1400" i="1"/>
+            </a:pPr>
+            <a:r>
+              <a:t>Visual representation of data flow through each experimental architecture</a:t>
             </a:r>
           </a:p>
         </p:txBody>
@@ -4066,7 +4260,7 @@
               <a:defRPr sz="3200" b="1"/>
             </a:pPr>
             <a:r>
-              <a:t>Experiment 3: Multi-Image Prompting</a:t>
+              <a:t>Experiment 1: OPG-only Baseline</a:t>
             </a:r>
           </a:p>
         </p:txBody>
@@ -4091,7 +4285,7 @@
               <a:defRPr sz="1800"/>
             </a:pPr>
             <a:r>
-              <a:t>Strategy: Feed multiple images with specialized prompts to MedGemma</a:t>
+              <a:t>Strategy: Establish single-modality baseline using panoramic X-rays</a:t>
             </a:r>
           </a:p>
           <a:p>
@@ -4112,81 +4306,73 @@
               <a:defRPr sz="1800"/>
             </a:pPr>
             <a:r>
-              <a:t>  • Frozen MedGemma-4B encoder + classification head</a:t>
-            </a:r>
-          </a:p>
-          <a:p>
-            <a:pPr>
-              <a:defRPr sz="1800"/>
-            </a:pPr>
-            <a:r>
-              <a:t>  • Multi-image input with &lt;start_of_image&gt; tokens</a:t>
-            </a:r>
-          </a:p>
-          <a:p>
-            <a:pPr>
-              <a:defRPr sz="1800"/>
-            </a:pPr>
-            <a:r>
-              <a:t>  • Modality-aware prompt engineering</a:t>
-            </a:r>
-          </a:p>
-          <a:p>
-            <a:pPr>
-              <a:defRPr sz="1800"/>
-            </a:pPr>
-          </a:p>
-          <a:p>
-            <a:pPr>
-              <a:defRPr sz="1800"/>
-            </a:pPr>
-            <a:r>
-              <a:t>Prompt Example:</a:t>
-            </a:r>
-          </a:p>
-          <a:p>
-            <a:pPr>
-              <a:defRPr sz="1800"/>
-            </a:pPr>
-            <a:r>
-              <a:t>  "&lt;start_of_image&gt; &lt;start_of_image&gt; &lt;start_of_image&gt;</a:t>
-            </a:r>
-          </a:p>
-          <a:p>
-            <a:pPr>
-              <a:defRPr sz="1800"/>
-            </a:pPr>
-            <a:r>
-              <a:t>   You are analyzing multiple orthodontic images...</a:t>
-            </a:r>
-          </a:p>
-          <a:p>
-            <a:pPr>
-              <a:defRPr sz="1800"/>
-            </a:pPr>
-            <a:r>
-              <a:t>   Image 1 is a panoramic X-ray (OPG).</a:t>
-            </a:r>
-          </a:p>
-          <a:p>
-            <a:pPr>
-              <a:defRPr sz="1800"/>
-            </a:pPr>
-            <a:r>
-              <a:t>   Image 2 is an intraoral photograph..."</a:t>
-            </a:r>
-          </a:p>
-          <a:p>
-            <a:pPr>
-              <a:defRPr sz="1800"/>
-            </a:pPr>
-          </a:p>
-          <a:p>
-            <a:pPr>
-              <a:defRPr sz="1800"/>
-            </a:pPr>
-            <a:r>
-              <a:t>Best Performance: 72.73% validation accuracy</a:t>
+              <a:t>  • Frozen MedGemma-4B vision encoder (1152-dim features)</a:t>
+            </a:r>
+          </a:p>
+          <a:p>
+            <a:pPr>
+              <a:defRPr sz="1800"/>
+            </a:pPr>
+            <a:r>
+              <a:t>  • Trainable classification head</a:t>
+            </a:r>
+          </a:p>
+          <a:p>
+            <a:pPr>
+              <a:defRPr sz="1800"/>
+            </a:pPr>
+            <a:r>
+              <a:t>  • Robust 3-tier modality filtering</a:t>
+            </a:r>
+          </a:p>
+          <a:p>
+            <a:pPr>
+              <a:defRPr sz="1800"/>
+            </a:pPr>
+          </a:p>
+          <a:p>
+            <a:pPr>
+              <a:defRPr sz="1800"/>
+            </a:pPr>
+            <a:r>
+              <a:t>Training:</a:t>
+            </a:r>
+          </a:p>
+          <a:p>
+            <a:pPr>
+              <a:defRPr sz="1800"/>
+            </a:pPr>
+            <a:r>
+              <a:t>  • 20 epochs, batch size 8</a:t>
+            </a:r>
+          </a:p>
+          <a:p>
+            <a:pPr>
+              <a:defRPr sz="1800"/>
+            </a:pPr>
+            <a:r>
+              <a:t>  • AdamW optimizer, Cosine LR scheduler</a:t>
+            </a:r>
+          </a:p>
+          <a:p>
+            <a:pPr>
+              <a:defRPr sz="1800"/>
+            </a:pPr>
+            <a:r>
+              <a:t>  • Only OPG images used</a:t>
+            </a:r>
+          </a:p>
+          <a:p>
+            <a:pPr>
+              <a:defRPr sz="1800"/>
+            </a:pPr>
+          </a:p>
+          <a:p>
+            <a:pPr>
+              <a:defRPr sz="1800"/>
+            </a:pPr>
+            <a:r>
+              <a:t>Best Performance: 66.67% validation accuracy (epoch 1)</a:t>
             </a:r>
           </a:p>
         </p:txBody>
@@ -4200,6 +4386,306 @@
 </file>
 
 <file path=ppt/slides/slide7.xml><?xml version="1.0" encoding="utf-8"?>
+<p:sld xmlns:a="http://schemas.openxmlformats.org/drawingml/2006/main" xmlns:p="http://schemas.openxmlformats.org/presentationml/2006/main" xmlns:r="http://schemas.openxmlformats.org/officeDocument/2006/relationships">
+  <p:cSld>
+    <p:spTree>
+      <p:nvGrpSpPr>
+        <p:cNvPr id="1" name=""/>
+        <p:cNvGrpSpPr/>
+        <p:nvPr/>
+      </p:nvGrpSpPr>
+      <p:grpSpPr/>
+      <p:sp>
+        <p:nvSpPr>
+          <p:cNvPr id="2" name="Title 1"/>
+          <p:cNvSpPr>
+            <a:spLocks noGrp="1"/>
+          </p:cNvSpPr>
+          <p:nvPr>
+            <p:ph type="title"/>
+          </p:nvPr>
+        </p:nvSpPr>
+        <p:spPr/>
+        <p:txBody>
+          <a:bodyPr/>
+          <a:lstStyle/>
+          <a:p>
+            <a:pPr>
+              <a:defRPr sz="3200" b="1"/>
+            </a:pPr>
+            <a:r>
+              <a:t>Experiment 2: Naïve Late Fusion</a:t>
+            </a:r>
+          </a:p>
+        </p:txBody>
+      </p:sp>
+      <p:sp>
+        <p:nvSpPr>
+          <p:cNvPr id="3" name="Content Placeholder 2"/>
+          <p:cNvSpPr>
+            <a:spLocks noGrp="1"/>
+          </p:cNvSpPr>
+          <p:nvPr>
+            <p:ph idx="1"/>
+          </p:nvPr>
+        </p:nvSpPr>
+        <p:spPr/>
+        <p:txBody>
+          <a:bodyPr/>
+          <a:lstStyle/>
+          <a:p/>
+          <a:p>
+            <a:pPr>
+              <a:defRPr sz="1800"/>
+            </a:pPr>
+            <a:r>
+              <a:t>Strategy: Train separate classifiers per modality, fuse at decision level</a:t>
+            </a:r>
+          </a:p>
+          <a:p>
+            <a:pPr>
+              <a:defRPr sz="1800"/>
+            </a:pPr>
+          </a:p>
+          <a:p>
+            <a:pPr>
+              <a:defRPr sz="1800"/>
+            </a:pPr>
+            <a:r>
+              <a:t>Architecture:</a:t>
+            </a:r>
+          </a:p>
+          <a:p>
+            <a:pPr>
+              <a:defRPr sz="1800"/>
+            </a:pPr>
+            <a:r>
+              <a:t>  • Intraoral CNN: SimpleClassifier (512-dim) → intraoral images</a:t>
+            </a:r>
+          </a:p>
+          <a:p>
+            <a:pPr>
+              <a:defRPr sz="1800"/>
+            </a:pPr>
+            <a:r>
+              <a:t>  • OPG CNN: SimpleClassifier (512-dim) → panoramic X-rays</a:t>
+            </a:r>
+          </a:p>
+          <a:p>
+            <a:pPr>
+              <a:defRPr sz="1800"/>
+            </a:pPr>
+            <a:r>
+              <a:t>  • Ceph CNN: SimpleClassifier (512-dim) → cephalometric X-rays</a:t>
+            </a:r>
+          </a:p>
+          <a:p>
+            <a:pPr>
+              <a:defRPr sz="1800"/>
+            </a:pPr>
+            <a:r>
+              <a:t>  • Fusion: Average predictions from all three classifiers</a:t>
+            </a:r>
+          </a:p>
+          <a:p>
+            <a:pPr>
+              <a:defRPr sz="1800"/>
+            </a:pPr>
+          </a:p>
+          <a:p>
+            <a:pPr>
+              <a:defRPr sz="1800"/>
+            </a:pPr>
+            <a:r>
+              <a:t>Training: Sequential training, 45 epochs each modality</a:t>
+            </a:r>
+          </a:p>
+          <a:p>
+            <a:pPr>
+              <a:defRPr sz="1800"/>
+            </a:pPr>
+          </a:p>
+          <a:p>
+            <a:pPr>
+              <a:defRPr sz="1800"/>
+            </a:pPr>
+            <a:r>
+              <a:t>Best Performance: 93.51% validation accuracy ⭐</a:t>
+            </a:r>
+          </a:p>
+        </p:txBody>
+      </p:sp>
+    </p:spTree>
+  </p:cSld>
+  <p:clrMapOvr>
+    <a:masterClrMapping/>
+  </p:clrMapOvr>
+</p:sld>
+</file>
+
+<file path=ppt/slides/slide8.xml><?xml version="1.0" encoding="utf-8"?>
+<p:sld xmlns:a="http://schemas.openxmlformats.org/drawingml/2006/main" xmlns:p="http://schemas.openxmlformats.org/presentationml/2006/main" xmlns:r="http://schemas.openxmlformats.org/officeDocument/2006/relationships">
+  <p:cSld>
+    <p:spTree>
+      <p:nvGrpSpPr>
+        <p:cNvPr id="1" name=""/>
+        <p:cNvGrpSpPr/>
+        <p:nvPr/>
+      </p:nvGrpSpPr>
+      <p:grpSpPr/>
+      <p:sp>
+        <p:nvSpPr>
+          <p:cNvPr id="2" name="Title 1"/>
+          <p:cNvSpPr>
+            <a:spLocks noGrp="1"/>
+          </p:cNvSpPr>
+          <p:nvPr>
+            <p:ph type="title"/>
+          </p:nvPr>
+        </p:nvSpPr>
+        <p:spPr/>
+        <p:txBody>
+          <a:bodyPr/>
+          <a:lstStyle/>
+          <a:p>
+            <a:pPr>
+              <a:defRPr sz="3200" b="1"/>
+            </a:pPr>
+            <a:r>
+              <a:t>Experiment 3: Multi-Image Prompting</a:t>
+            </a:r>
+          </a:p>
+        </p:txBody>
+      </p:sp>
+      <p:sp>
+        <p:nvSpPr>
+          <p:cNvPr id="3" name="Content Placeholder 2"/>
+          <p:cNvSpPr>
+            <a:spLocks noGrp="1"/>
+          </p:cNvSpPr>
+          <p:nvPr>
+            <p:ph idx="1"/>
+          </p:nvPr>
+        </p:nvSpPr>
+        <p:spPr/>
+        <p:txBody>
+          <a:bodyPr/>
+          <a:lstStyle/>
+          <a:p/>
+          <a:p>
+            <a:pPr>
+              <a:defRPr sz="1800"/>
+            </a:pPr>
+            <a:r>
+              <a:t>Strategy: Feed multiple images with specialized prompts to MedGemma</a:t>
+            </a:r>
+          </a:p>
+          <a:p>
+            <a:pPr>
+              <a:defRPr sz="1800"/>
+            </a:pPr>
+          </a:p>
+          <a:p>
+            <a:pPr>
+              <a:defRPr sz="1800"/>
+            </a:pPr>
+            <a:r>
+              <a:t>Architecture:</a:t>
+            </a:r>
+          </a:p>
+          <a:p>
+            <a:pPr>
+              <a:defRPr sz="1800"/>
+            </a:pPr>
+            <a:r>
+              <a:t>  • Frozen MedGemma-4B encoder + classification head</a:t>
+            </a:r>
+          </a:p>
+          <a:p>
+            <a:pPr>
+              <a:defRPr sz="1800"/>
+            </a:pPr>
+            <a:r>
+              <a:t>  • Multi-image input with &lt;start_of_image&gt; tokens</a:t>
+            </a:r>
+          </a:p>
+          <a:p>
+            <a:pPr>
+              <a:defRPr sz="1800"/>
+            </a:pPr>
+            <a:r>
+              <a:t>  • Modality-aware prompt engineering</a:t>
+            </a:r>
+          </a:p>
+          <a:p>
+            <a:pPr>
+              <a:defRPr sz="1800"/>
+            </a:pPr>
+          </a:p>
+          <a:p>
+            <a:pPr>
+              <a:defRPr sz="1800"/>
+            </a:pPr>
+            <a:r>
+              <a:t>Prompt Example:</a:t>
+            </a:r>
+          </a:p>
+          <a:p>
+            <a:pPr>
+              <a:defRPr sz="1800"/>
+            </a:pPr>
+            <a:r>
+              <a:t>  "&lt;start_of_image&gt; &lt;start_of_image&gt; &lt;start_of_image&gt;</a:t>
+            </a:r>
+          </a:p>
+          <a:p>
+            <a:pPr>
+              <a:defRPr sz="1800"/>
+            </a:pPr>
+            <a:r>
+              <a:t>   You are analyzing multiple orthodontic images...</a:t>
+            </a:r>
+          </a:p>
+          <a:p>
+            <a:pPr>
+              <a:defRPr sz="1800"/>
+            </a:pPr>
+            <a:r>
+              <a:t>   Image 1 is a panoramic X-ray (OPG).</a:t>
+            </a:r>
+          </a:p>
+          <a:p>
+            <a:pPr>
+              <a:defRPr sz="1800"/>
+            </a:pPr>
+            <a:r>
+              <a:t>   Image 2 is an intraoral photograph..."</a:t>
+            </a:r>
+          </a:p>
+          <a:p>
+            <a:pPr>
+              <a:defRPr sz="1800"/>
+            </a:pPr>
+          </a:p>
+          <a:p>
+            <a:pPr>
+              <a:defRPr sz="1800"/>
+            </a:pPr>
+            <a:r>
+              <a:t>Best Performance: 72.73% validation accuracy</a:t>
+            </a:r>
+          </a:p>
+        </p:txBody>
+      </p:sp>
+    </p:spTree>
+  </p:cSld>
+  <p:clrMapOvr>
+    <a:masterClrMapping/>
+  </p:clrMapOvr>
+</p:sld>
+</file>
+
+<file path=ppt/slides/slide9.xml><?xml version="1.0" encoding="utf-8"?>
 <p:sld xmlns:a="http://schemas.openxmlformats.org/drawingml/2006/main" xmlns:p="http://schemas.openxmlformats.org/presentationml/2006/main" xmlns:r="http://schemas.openxmlformats.org/officeDocument/2006/relationships">
   <p:cSld>
     <p:spTree>
@@ -4308,248 +4794,6 @@
             </a:pPr>
             <a:r>
               <a:t>Comparison of training and validation metrics across all experiments</a:t>
-            </a:r>
-          </a:p>
-        </p:txBody>
-      </p:sp>
-    </p:spTree>
-  </p:cSld>
-  <p:clrMapOvr>
-    <a:masterClrMapping/>
-  </p:clrMapOvr>
-</p:sld>
-</file>
-
-<file path=ppt/slides/slide8.xml><?xml version="1.0" encoding="utf-8"?>
-<p:sld xmlns:a="http://schemas.openxmlformats.org/drawingml/2006/main" xmlns:p="http://schemas.openxmlformats.org/presentationml/2006/main" xmlns:r="http://schemas.openxmlformats.org/officeDocument/2006/relationships">
-  <p:cSld>
-    <p:spTree>
-      <p:nvGrpSpPr>
-        <p:cNvPr id="1" name=""/>
-        <p:cNvGrpSpPr/>
-        <p:nvPr/>
-      </p:nvGrpSpPr>
-      <p:grpSpPr/>
-      <p:sp>
-        <p:nvSpPr>
-          <p:cNvPr id="2" name="Title 1"/>
-          <p:cNvSpPr>
-            <a:spLocks noGrp="1"/>
-          </p:cNvSpPr>
-          <p:nvPr>
-            <p:ph type="title"/>
-          </p:nvPr>
-        </p:nvSpPr>
-        <p:spPr/>
-        <p:txBody>
-          <a:bodyPr/>
-          <a:lstStyle/>
-          <a:p/>
-        </p:txBody>
-      </p:sp>
-      <p:sp>
-        <p:nvSpPr>
-          <p:cNvPr id="3" name="TextBox 2"/>
-          <p:cNvSpPr txBox="1"/>
-          <p:nvPr/>
-        </p:nvSpPr>
-        <p:spPr>
-          <a:xfrm>
-            <a:off x="457200" y="274320"/>
-            <a:ext cx="8229600" cy="548640"/>
-          </a:xfrm>
-          <a:prstGeom prst="rect">
-            <a:avLst/>
-          </a:prstGeom>
-          <a:noFill/>
-        </p:spPr>
-        <p:txBody>
-          <a:bodyPr wrap="none">
-            <a:spAutoFit/>
-          </a:bodyPr>
-          <a:lstStyle/>
-          <a:p>
-            <a:pPr>
-              <a:defRPr sz="2800" b="1"/>
-            </a:pPr>
-            <a:r>
-              <a:t>E1: OPG-only Baseline - Training Dynamics</a:t>
-            </a:r>
-          </a:p>
-        </p:txBody>
-      </p:sp>
-      <p:pic>
-        <p:nvPicPr>
-          <p:cNvPr id="4" name="Picture 3" descr="E1_OPG-only_Baseline_metrics.png"/>
-          <p:cNvPicPr>
-            <a:picLocks noChangeAspect="1"/>
-          </p:cNvPicPr>
-          <p:nvPr/>
-        </p:nvPicPr>
-        <p:blipFill>
-          <a:blip r:embed="rId2"/>
-          <a:stretch>
-            <a:fillRect/>
-          </a:stretch>
-        </p:blipFill>
-        <p:spPr>
-          <a:xfrm>
-            <a:off x="457200" y="1097280"/>
-            <a:ext cx="8229600" cy="2904333"/>
-          </a:xfrm>
-          <a:prstGeom prst="rect">
-            <a:avLst/>
-          </a:prstGeom>
-        </p:spPr>
-      </p:pic>
-      <p:sp>
-        <p:nvSpPr>
-          <p:cNvPr id="5" name="TextBox 4"/>
-          <p:cNvSpPr txBox="1"/>
-          <p:nvPr/>
-        </p:nvSpPr>
-        <p:spPr>
-          <a:xfrm>
-            <a:off x="457200" y="5943600"/>
-            <a:ext cx="8229600" cy="457200"/>
-          </a:xfrm>
-          <a:prstGeom prst="rect">
-            <a:avLst/>
-          </a:prstGeom>
-          <a:noFill/>
-        </p:spPr>
-        <p:txBody>
-          <a:bodyPr wrap="none">
-            <a:spAutoFit/>
-          </a:bodyPr>
-          <a:lstStyle/>
-          <a:p>
-            <a:pPr>
-              <a:defRPr sz="1400" i="1"/>
-            </a:pPr>
-            <a:r>
-              <a:t>Shows overfitting - validation loss increases while training continues</a:t>
-            </a:r>
-          </a:p>
-        </p:txBody>
-      </p:sp>
-    </p:spTree>
-  </p:cSld>
-  <p:clrMapOvr>
-    <a:masterClrMapping/>
-  </p:clrMapOvr>
-</p:sld>
-</file>
-
-<file path=ppt/slides/slide9.xml><?xml version="1.0" encoding="utf-8"?>
-<p:sld xmlns:a="http://schemas.openxmlformats.org/drawingml/2006/main" xmlns:p="http://schemas.openxmlformats.org/presentationml/2006/main" xmlns:r="http://schemas.openxmlformats.org/officeDocument/2006/relationships">
-  <p:cSld>
-    <p:spTree>
-      <p:nvGrpSpPr>
-        <p:cNvPr id="1" name=""/>
-        <p:cNvGrpSpPr/>
-        <p:nvPr/>
-      </p:nvGrpSpPr>
-      <p:grpSpPr/>
-      <p:sp>
-        <p:nvSpPr>
-          <p:cNvPr id="2" name="Title 1"/>
-          <p:cNvSpPr>
-            <a:spLocks noGrp="1"/>
-          </p:cNvSpPr>
-          <p:nvPr>
-            <p:ph type="title"/>
-          </p:nvPr>
-        </p:nvSpPr>
-        <p:spPr/>
-        <p:txBody>
-          <a:bodyPr/>
-          <a:lstStyle/>
-          <a:p/>
-        </p:txBody>
-      </p:sp>
-      <p:sp>
-        <p:nvSpPr>
-          <p:cNvPr id="3" name="TextBox 2"/>
-          <p:cNvSpPr txBox="1"/>
-          <p:nvPr/>
-        </p:nvSpPr>
-        <p:spPr>
-          <a:xfrm>
-            <a:off x="457200" y="274320"/>
-            <a:ext cx="8229600" cy="548640"/>
-          </a:xfrm>
-          <a:prstGeom prst="rect">
-            <a:avLst/>
-          </a:prstGeom>
-          <a:noFill/>
-        </p:spPr>
-        <p:txBody>
-          <a:bodyPr wrap="none">
-            <a:spAutoFit/>
-          </a:bodyPr>
-          <a:lstStyle/>
-          <a:p>
-            <a:pPr>
-              <a:defRPr sz="2800" b="1"/>
-            </a:pPr>
-            <a:r>
-              <a:t>E2: Late Fusion - Training Dynamics (Best Performer)</a:t>
-            </a:r>
-          </a:p>
-        </p:txBody>
-      </p:sp>
-      <p:pic>
-        <p:nvPicPr>
-          <p:cNvPr id="4" name="Picture 3" descr="E2_Late_Fusion_metrics.png"/>
-          <p:cNvPicPr>
-            <a:picLocks noChangeAspect="1"/>
-          </p:cNvPicPr>
-          <p:nvPr/>
-        </p:nvPicPr>
-        <p:blipFill>
-          <a:blip r:embed="rId2"/>
-          <a:stretch>
-            <a:fillRect/>
-          </a:stretch>
-        </p:blipFill>
-        <p:spPr>
-          <a:xfrm>
-            <a:off x="457200" y="1097280"/>
-            <a:ext cx="8229600" cy="2904333"/>
-          </a:xfrm>
-          <a:prstGeom prst="rect">
-            <a:avLst/>
-          </a:prstGeom>
-        </p:spPr>
-      </p:pic>
-      <p:sp>
-        <p:nvSpPr>
-          <p:cNvPr id="5" name="TextBox 4"/>
-          <p:cNvSpPr txBox="1"/>
-          <p:nvPr/>
-        </p:nvSpPr>
-        <p:spPr>
-          <a:xfrm>
-            <a:off x="457200" y="5943600"/>
-            <a:ext cx="8229600" cy="457200"/>
-          </a:xfrm>
-          <a:prstGeom prst="rect">
-            <a:avLst/>
-          </a:prstGeom>
-          <a:noFill/>
-        </p:spPr>
-        <p:txBody>
-          <a:bodyPr wrap="none">
-            <a:spAutoFit/>
-          </a:bodyPr>
-          <a:lstStyle/>
-          <a:p>
-            <a:pPr>
-              <a:defRPr sz="1400" i="1"/>
-            </a:pPr>
-            <a:r>
-              <a:t>Extremely stable - maintains ~93.5% validation accuracy throughout</a:t>
             </a:r>
           </a:p>
         </p:txBody>

</xml_diff>